<commit_message>
Corn ppt is updated
</commit_message>
<xml_diff>
--- a/Corn kernels.pptx
+++ b/Corn kernels.pptx
@@ -766,7 +766,7 @@
           <a:p>
             <a:fld id="{27692BF5-B59F-4134-88BA-C7560F25EE94}" type="datetimeFigureOut">
               <a:rPr lang="en-IN" smtClean="0"/>
-              <a:t>17-08-2023</a:t>
+              <a:t>18-08-2023</a:t>
             </a:fld>
             <a:endParaRPr lang="en-IN"/>
           </a:p>
@@ -1886,7 +1886,7 @@
           <a:p>
             <a:fld id="{27692BF5-B59F-4134-88BA-C7560F25EE94}" type="datetimeFigureOut">
               <a:rPr lang="en-IN" smtClean="0"/>
-              <a:t>17-08-2023</a:t>
+              <a:t>18-08-2023</a:t>
             </a:fld>
             <a:endParaRPr lang="en-IN"/>
           </a:p>
@@ -2897,7 +2897,7 @@
           <a:p>
             <a:fld id="{27692BF5-B59F-4134-88BA-C7560F25EE94}" type="datetimeFigureOut">
               <a:rPr lang="en-IN" smtClean="0"/>
-              <a:t>17-08-2023</a:t>
+              <a:t>18-08-2023</a:t>
             </a:fld>
             <a:endParaRPr lang="en-IN"/>
           </a:p>
@@ -4067,7 +4067,7 @@
           <a:p>
             <a:fld id="{27692BF5-B59F-4134-88BA-C7560F25EE94}" type="datetimeFigureOut">
               <a:rPr lang="en-IN" smtClean="0"/>
-              <a:t>17-08-2023</a:t>
+              <a:t>18-08-2023</a:t>
             </a:fld>
             <a:endParaRPr lang="en-IN"/>
           </a:p>
@@ -5128,7 +5128,7 @@
           <a:p>
             <a:fld id="{27692BF5-B59F-4134-88BA-C7560F25EE94}" type="datetimeFigureOut">
               <a:rPr lang="en-IN" smtClean="0"/>
-              <a:t>17-08-2023</a:t>
+              <a:t>18-08-2023</a:t>
             </a:fld>
             <a:endParaRPr lang="en-IN"/>
           </a:p>
@@ -5774,7 +5774,7 @@
           <a:p>
             <a:fld id="{27692BF5-B59F-4134-88BA-C7560F25EE94}" type="datetimeFigureOut">
               <a:rPr lang="en-IN" smtClean="0"/>
-              <a:t>17-08-2023</a:t>
+              <a:t>18-08-2023</a:t>
             </a:fld>
             <a:endParaRPr lang="en-IN"/>
           </a:p>
@@ -6621,7 +6621,7 @@
           <a:p>
             <a:fld id="{27692BF5-B59F-4134-88BA-C7560F25EE94}" type="datetimeFigureOut">
               <a:rPr lang="en-IN" smtClean="0"/>
-              <a:t>17-08-2023</a:t>
+              <a:t>18-08-2023</a:t>
             </a:fld>
             <a:endParaRPr lang="en-IN"/>
           </a:p>
@@ -6796,7 +6796,7 @@
           <a:p>
             <a:fld id="{27692BF5-B59F-4134-88BA-C7560F25EE94}" type="datetimeFigureOut">
               <a:rPr lang="en-IN" smtClean="0"/>
-              <a:t>17-08-2023</a:t>
+              <a:t>18-08-2023</a:t>
             </a:fld>
             <a:endParaRPr lang="en-IN"/>
           </a:p>
@@ -7794,7 +7794,7 @@
           <a:p>
             <a:fld id="{27692BF5-B59F-4134-88BA-C7560F25EE94}" type="datetimeFigureOut">
               <a:rPr lang="en-IN" smtClean="0"/>
-              <a:t>17-08-2023</a:t>
+              <a:t>18-08-2023</a:t>
             </a:fld>
             <a:endParaRPr lang="en-IN"/>
           </a:p>
@@ -8000,7 +8000,7 @@
           <a:p>
             <a:fld id="{27692BF5-B59F-4134-88BA-C7560F25EE94}" type="datetimeFigureOut">
               <a:rPr lang="en-IN" smtClean="0"/>
-              <a:t>17-08-2023</a:t>
+              <a:t>18-08-2023</a:t>
             </a:fld>
             <a:endParaRPr lang="en-IN"/>
           </a:p>
@@ -9062,7 +9062,7 @@
           <a:p>
             <a:fld id="{27692BF5-B59F-4134-88BA-C7560F25EE94}" type="datetimeFigureOut">
               <a:rPr lang="en-IN" smtClean="0"/>
-              <a:t>17-08-2023</a:t>
+              <a:t>18-08-2023</a:t>
             </a:fld>
             <a:endParaRPr lang="en-IN"/>
           </a:p>
@@ -9334,7 +9334,7 @@
           <a:p>
             <a:fld id="{27692BF5-B59F-4134-88BA-C7560F25EE94}" type="datetimeFigureOut">
               <a:rPr lang="en-IN" smtClean="0"/>
-              <a:t>17-08-2023</a:t>
+              <a:t>18-08-2023</a:t>
             </a:fld>
             <a:endParaRPr lang="en-IN"/>
           </a:p>
@@ -9716,7 +9716,7 @@
           <a:p>
             <a:fld id="{27692BF5-B59F-4134-88BA-C7560F25EE94}" type="datetimeFigureOut">
               <a:rPr lang="en-IN" smtClean="0"/>
-              <a:t>17-08-2023</a:t>
+              <a:t>18-08-2023</a:t>
             </a:fld>
             <a:endParaRPr lang="en-IN"/>
           </a:p>
@@ -9834,7 +9834,7 @@
           <a:p>
             <a:fld id="{27692BF5-B59F-4134-88BA-C7560F25EE94}" type="datetimeFigureOut">
               <a:rPr lang="en-IN" smtClean="0"/>
-              <a:t>17-08-2023</a:t>
+              <a:t>18-08-2023</a:t>
             </a:fld>
             <a:endParaRPr lang="en-IN"/>
           </a:p>
@@ -9929,7 +9929,7 @@
           <a:p>
             <a:fld id="{27692BF5-B59F-4134-88BA-C7560F25EE94}" type="datetimeFigureOut">
               <a:rPr lang="en-IN" smtClean="0"/>
-              <a:t>17-08-2023</a:t>
+              <a:t>18-08-2023</a:t>
             </a:fld>
             <a:endParaRPr lang="en-IN"/>
           </a:p>
@@ -11038,7 +11038,7 @@
           <a:p>
             <a:fld id="{27692BF5-B59F-4134-88BA-C7560F25EE94}" type="datetimeFigureOut">
               <a:rPr lang="en-IN" smtClean="0"/>
-              <a:t>17-08-2023</a:t>
+              <a:t>18-08-2023</a:t>
             </a:fld>
             <a:endParaRPr lang="en-IN"/>
           </a:p>
@@ -12171,7 +12171,7 @@
           <a:p>
             <a:fld id="{27692BF5-B59F-4134-88BA-C7560F25EE94}" type="datetimeFigureOut">
               <a:rPr lang="en-IN" smtClean="0"/>
-              <a:t>17-08-2023</a:t>
+              <a:t>18-08-2023</a:t>
             </a:fld>
             <a:endParaRPr lang="en-IN"/>
           </a:p>
@@ -13199,7 +13199,7 @@
           <a:p>
             <a:fld id="{27692BF5-B59F-4134-88BA-C7560F25EE94}" type="datetimeFigureOut">
               <a:rPr lang="en-IN" smtClean="0"/>
-              <a:t>17-08-2023</a:t>
+              <a:t>18-08-2023</a:t>
             </a:fld>
             <a:endParaRPr lang="en-IN"/>
           </a:p>
@@ -14586,7 +14586,25 @@
                 </a:solidFill>
                 <a:latin typeface="SansSerif" panose="00000400000000000000" pitchFamily="2" charset="2"/>
               </a:rPr>
-              <a:t>Our Aim is calculate the length, width and kernels for each corn which is not plucked from the plant. By using the </a:t>
+              <a:t>Our Aim is calculate the length, width </a:t>
+            </a:r>
+            <a:r>
+              <a:rPr lang="en-IN" sz="1600" dirty="0" smtClean="0">
+                <a:solidFill>
+                  <a:schemeClr val="bg1"/>
+                </a:solidFill>
+                <a:latin typeface="SansSerif" panose="00000400000000000000" pitchFamily="2" charset="2"/>
+              </a:rPr>
+              <a:t>and count No. of </a:t>
+            </a:r>
+            <a:r>
+              <a:rPr lang="en-IN" sz="1600" dirty="0" smtClean="0">
+                <a:solidFill>
+                  <a:schemeClr val="bg1"/>
+                </a:solidFill>
+                <a:latin typeface="SansSerif" panose="00000400000000000000" pitchFamily="2" charset="2"/>
+              </a:rPr>
+              <a:t>kernels for each corn which is not plucked from the plant. By using the </a:t>
             </a:r>
             <a:r>
               <a:rPr lang="en-IN" sz="1600" dirty="0" err="1" smtClean="0">
@@ -15082,7 +15100,7 @@
                         <p:par>
                           <p:cTn id="13" fill="hold">
                             <p:stCondLst>
-                              <p:cond delay="16200"/>
+                              <p:cond delay="17400"/>
                             </p:stCondLst>
                             <p:childTnLst>
                               <p:par>
@@ -15126,7 +15144,7 @@
                         <p:par>
                           <p:cTn id="17" fill="hold">
                             <p:stCondLst>
-                              <p:cond delay="19700"/>
+                              <p:cond delay="20900"/>
                             </p:stCondLst>
                             <p:childTnLst>
                               <p:par>
@@ -15162,7 +15180,7 @@
                         <p:par>
                           <p:cTn id="20" fill="hold">
                             <p:stCondLst>
-                              <p:cond delay="19700"/>
+                              <p:cond delay="20900"/>
                             </p:stCondLst>
                             <p:childTnLst>
                               <p:par>
@@ -15198,7 +15216,7 @@
                         <p:par>
                           <p:cTn id="23" fill="hold">
                             <p:stCondLst>
-                              <p:cond delay="19700"/>
+                              <p:cond delay="20900"/>
                             </p:stCondLst>
                             <p:childTnLst>
                               <p:par>
@@ -15242,7 +15260,7 @@
                         <p:par>
                           <p:cTn id="27" fill="hold">
                             <p:stCondLst>
-                              <p:cond delay="20200"/>
+                              <p:cond delay="21400"/>
                             </p:stCondLst>
                             <p:childTnLst>
                               <p:par>
@@ -15286,7 +15304,7 @@
                         <p:par>
                           <p:cTn id="31" fill="hold">
                             <p:stCondLst>
-                              <p:cond delay="20700"/>
+                              <p:cond delay="21900"/>
                             </p:stCondLst>
                             <p:childTnLst>
                               <p:par>
@@ -16337,7 +16355,29 @@
                 <a:ea typeface="Verdana" panose="020B0604030504040204" pitchFamily="34" charset="0"/>
                 <a:sym typeface="Wingdings" panose="05000000000000000000" pitchFamily="2" charset="2"/>
               </a:rPr>
-              <a:t> code of the corn and also the desired </a:t>
+              <a:t> </a:t>
+            </a:r>
+            <a:r>
+              <a:rPr lang="en-IN" sz="1500" dirty="0" smtClean="0">
+                <a:solidFill>
+                  <a:srgbClr val="FFFF00"/>
+                </a:solidFill>
+                <a:latin typeface="SansSerif" panose="00000400000000000000" pitchFamily="2" charset="2"/>
+                <a:ea typeface="Verdana" panose="020B0604030504040204" pitchFamily="34" charset="0"/>
+                <a:sym typeface="Wingdings" panose="05000000000000000000" pitchFamily="2" charset="2"/>
+              </a:rPr>
+              <a:t>of </a:t>
+            </a:r>
+            <a:r>
+              <a:rPr lang="en-IN" sz="1500" dirty="0" smtClean="0">
+                <a:solidFill>
+                  <a:srgbClr val="FFFF00"/>
+                </a:solidFill>
+                <a:latin typeface="SansSerif" panose="00000400000000000000" pitchFamily="2" charset="2"/>
+                <a:ea typeface="Verdana" panose="020B0604030504040204" pitchFamily="34" charset="0"/>
+                <a:sym typeface="Wingdings" panose="05000000000000000000" pitchFamily="2" charset="2"/>
+              </a:rPr>
+              <a:t>the corn and also the desired </a:t>
             </a:r>
             <a:r>
               <a:rPr lang="en-IN" sz="1500" dirty="0" err="1" smtClean="0">
@@ -16441,8 +16481,8 @@
         </p:nvSpPr>
         <p:spPr>
           <a:xfrm>
-            <a:off x="6276672" y="630535"/>
-            <a:ext cx="4134465" cy="1015663"/>
+            <a:off x="6372852" y="630535"/>
+            <a:ext cx="3942105" cy="1015663"/>
           </a:xfrm>
           <a:prstGeom prst="rect">
             <a:avLst/>
@@ -16490,7 +16530,7 @@
                 <a:latin typeface="SansSerif" panose="00000400000000000000" pitchFamily="2" charset="2"/>
                 <a:ea typeface="Verdana" panose="020B0604030504040204" pitchFamily="34" charset="0"/>
               </a:rPr>
-              <a:t>Countor’s</a:t>
+              <a:t>Countors</a:t>
             </a:r>
             <a:r>
               <a:rPr lang="en-US" sz="3000" b="0" cap="none" spc="0" dirty="0" smtClean="0">
@@ -16510,6 +16550,21 @@
               </a:rPr>
               <a:t> </a:t>
             </a:r>
+            <a:endParaRPr lang="en-US" sz="3000" b="0" cap="none" spc="0" dirty="0" smtClean="0">
+              <a:ln w="0"/>
+              <a:solidFill>
+                <a:schemeClr val="tx1"/>
+              </a:solidFill>
+              <a:effectLst>
+                <a:outerShdw blurRad="38100" dist="19050" dir="2700000" algn="tl" rotWithShape="0">
+                  <a:schemeClr val="dk1">
+                    <a:alpha val="40000"/>
+                  </a:schemeClr>
+                </a:outerShdw>
+              </a:effectLst>
+              <a:latin typeface="SansSerif" panose="00000400000000000000" pitchFamily="2" charset="2"/>
+              <a:ea typeface="Verdana" panose="020B0604030504040204" pitchFamily="34" charset="0"/>
+            </a:endParaRPr>
           </a:p>
           <a:p>
             <a:pPr algn="ctr"/>
@@ -16770,7 +16825,7 @@
                         <p:par>
                           <p:cTn id="15" fill="hold">
                             <p:stCondLst>
-                              <p:cond delay="11300"/>
+                              <p:cond delay="11100"/>
                             </p:stCondLst>
                             <p:childTnLst>
                               <p:par>
@@ -16876,7 +16931,7 @@
                         <p:par>
                           <p:cTn id="21" fill="hold">
                             <p:stCondLst>
-                              <p:cond delay="13800"/>
+                              <p:cond delay="13600"/>
                             </p:stCondLst>
                             <p:childTnLst>
                               <p:par>
@@ -16982,7 +17037,7 @@
                         <p:par>
                           <p:cTn id="27" fill="hold">
                             <p:stCondLst>
-                              <p:cond delay="16800"/>
+                              <p:cond delay="16600"/>
                             </p:stCondLst>
                             <p:childTnLst>
                               <p:par>
@@ -17026,7 +17081,7 @@
                         <p:par>
                           <p:cTn id="31" fill="hold">
                             <p:stCondLst>
-                              <p:cond delay="18800"/>
+                              <p:cond delay="18600"/>
                             </p:stCondLst>
                             <p:childTnLst>
                               <p:par>
@@ -18497,8 +18552,29 @@
               <a:rPr lang="en-IN" dirty="0" smtClean="0">
                 <a:latin typeface="SansSerif" panose="00000400000000000000" pitchFamily="2" charset="2"/>
               </a:rPr>
-              <a:t>The corn colour, kernels and length width are calculated by using Python and some of the image processing technique's.</a:t>
+              <a:t>The corn colour, kernels and length width are calculated by using Python </a:t>
             </a:r>
+            <a:r>
+              <a:rPr lang="en-IN" dirty="0" smtClean="0">
+                <a:latin typeface="SansSerif" panose="00000400000000000000" pitchFamily="2" charset="2"/>
+              </a:rPr>
+              <a:t>and </a:t>
+            </a:r>
+            <a:r>
+              <a:rPr lang="en-IN" dirty="0" smtClean="0">
+                <a:latin typeface="SansSerif" panose="00000400000000000000" pitchFamily="2" charset="2"/>
+              </a:rPr>
+              <a:t>image processing </a:t>
+            </a:r>
+            <a:r>
+              <a:rPr lang="en-IN" dirty="0" smtClean="0">
+                <a:latin typeface="SansSerif" panose="00000400000000000000" pitchFamily="2" charset="2"/>
+              </a:rPr>
+              <a:t>technique.</a:t>
+            </a:r>
+            <a:endParaRPr lang="en-IN" dirty="0" smtClean="0">
+              <a:latin typeface="SansSerif" panose="00000400000000000000" pitchFamily="2" charset="2"/>
+            </a:endParaRPr>
           </a:p>
           <a:p>
             <a:pPr>
@@ -18510,8 +18586,23 @@
               <a:rPr lang="en-IN" dirty="0" smtClean="0">
                 <a:latin typeface="SansSerif" panose="00000400000000000000" pitchFamily="2" charset="2"/>
               </a:rPr>
-              <a:t>As we seen the number of kernels is 163 and it is taken only in the 2D image and calculated by the desired value of 2.7 which is still existing in the Chinese research. </a:t>
+              <a:t>As we seen the number of kernels is 163 and it is taken only in the 2D image and calculated by the desired value of 2.7 which is still existing in the Chinese </a:t>
             </a:r>
+            <a:r>
+              <a:rPr lang="en-IN" smtClean="0">
+                <a:latin typeface="SansSerif" panose="00000400000000000000" pitchFamily="2" charset="2"/>
+              </a:rPr>
+              <a:t>research</a:t>
+            </a:r>
+            <a:r>
+              <a:rPr lang="en-IN" smtClean="0">
+                <a:latin typeface="SansSerif" panose="00000400000000000000" pitchFamily="2" charset="2"/>
+              </a:rPr>
+              <a:t>.</a:t>
+            </a:r>
+            <a:endParaRPr lang="en-IN" dirty="0" smtClean="0">
+              <a:latin typeface="SansSerif" panose="00000400000000000000" pitchFamily="2" charset="2"/>
+            </a:endParaRPr>
           </a:p>
           <a:p>
             <a:pPr>
@@ -18743,7 +18834,7 @@
                         <p:par>
                           <p:cTn id="14" fill="hold">
                             <p:stCondLst>
-                              <p:cond delay="8400"/>
+                              <p:cond delay="7800"/>
                             </p:stCondLst>
                             <p:childTnLst>
                               <p:par>
@@ -18840,7 +18931,7 @@
                         <p:par>
                           <p:cTn id="19" fill="hold">
                             <p:stCondLst>
-                              <p:cond delay="18200"/>
+                              <p:cond delay="17600"/>
                             </p:stCondLst>
                             <p:childTnLst>
                               <p:par>

</xml_diff>